<commit_message>
Added the new demos for the presentation.
</commit_message>
<xml_diff>
--- a/MvcTurbine/sponsors.pptx
+++ b/MvcTurbine/sponsors.pptx
@@ -6,6 +6,8 @@
   </p:sldMasterIdLst>
   <p:sldIdLst>
     <p:sldId id="256" r:id="rId2"/>
+    <p:sldId id="258" r:id="rId3"/>
+    <p:sldId id="257" r:id="rId4"/>
   </p:sldIdLst>
   <p:sldSz cx="9144000" cy="6858000" type="screen4x3"/>
   <p:notesSz cx="6858000" cy="9144000"/>
@@ -288,7 +290,7 @@
           <a:p>
             <a:fld id="{A766CCD6-D314-4803-A6EB-FAB5614A40F7}" type="datetimeFigureOut">
               <a:rPr lang="es-GT" smtClean="0"/>
-              <a:t>19/03/2010</a:t>
+              <a:t>20/03/2010</a:t>
             </a:fld>
             <a:endParaRPr lang="es-GT"/>
           </a:p>
@@ -458,7 +460,7 @@
           <a:p>
             <a:fld id="{A766CCD6-D314-4803-A6EB-FAB5614A40F7}" type="datetimeFigureOut">
               <a:rPr lang="es-GT" smtClean="0"/>
-              <a:t>19/03/2010</a:t>
+              <a:t>20/03/2010</a:t>
             </a:fld>
             <a:endParaRPr lang="es-GT"/>
           </a:p>
@@ -638,7 +640,7 @@
           <a:p>
             <a:fld id="{A766CCD6-D314-4803-A6EB-FAB5614A40F7}" type="datetimeFigureOut">
               <a:rPr lang="es-GT" smtClean="0"/>
-              <a:t>19/03/2010</a:t>
+              <a:t>20/03/2010</a:t>
             </a:fld>
             <a:endParaRPr lang="es-GT"/>
           </a:p>
@@ -808,7 +810,7 @@
           <a:p>
             <a:fld id="{A766CCD6-D314-4803-A6EB-FAB5614A40F7}" type="datetimeFigureOut">
               <a:rPr lang="es-GT" smtClean="0"/>
-              <a:t>19/03/2010</a:t>
+              <a:t>20/03/2010</a:t>
             </a:fld>
             <a:endParaRPr lang="es-GT"/>
           </a:p>
@@ -1054,7 +1056,7 @@
           <a:p>
             <a:fld id="{A766CCD6-D314-4803-A6EB-FAB5614A40F7}" type="datetimeFigureOut">
               <a:rPr lang="es-GT" smtClean="0"/>
-              <a:t>19/03/2010</a:t>
+              <a:t>20/03/2010</a:t>
             </a:fld>
             <a:endParaRPr lang="es-GT"/>
           </a:p>
@@ -1342,7 +1344,7 @@
           <a:p>
             <a:fld id="{A766CCD6-D314-4803-A6EB-FAB5614A40F7}" type="datetimeFigureOut">
               <a:rPr lang="es-GT" smtClean="0"/>
-              <a:t>19/03/2010</a:t>
+              <a:t>20/03/2010</a:t>
             </a:fld>
             <a:endParaRPr lang="es-GT"/>
           </a:p>
@@ -1764,7 +1766,7 @@
           <a:p>
             <a:fld id="{A766CCD6-D314-4803-A6EB-FAB5614A40F7}" type="datetimeFigureOut">
               <a:rPr lang="es-GT" smtClean="0"/>
-              <a:t>19/03/2010</a:t>
+              <a:t>20/03/2010</a:t>
             </a:fld>
             <a:endParaRPr lang="es-GT"/>
           </a:p>
@@ -1882,7 +1884,7 @@
           <a:p>
             <a:fld id="{A766CCD6-D314-4803-A6EB-FAB5614A40F7}" type="datetimeFigureOut">
               <a:rPr lang="es-GT" smtClean="0"/>
-              <a:t>19/03/2010</a:t>
+              <a:t>20/03/2010</a:t>
             </a:fld>
             <a:endParaRPr lang="es-GT"/>
           </a:p>
@@ -1977,7 +1979,7 @@
           <a:p>
             <a:fld id="{A766CCD6-D314-4803-A6EB-FAB5614A40F7}" type="datetimeFigureOut">
               <a:rPr lang="es-GT" smtClean="0"/>
-              <a:t>19/03/2010</a:t>
+              <a:t>20/03/2010</a:t>
             </a:fld>
             <a:endParaRPr lang="es-GT"/>
           </a:p>
@@ -2254,7 +2256,7 @@
           <a:p>
             <a:fld id="{A766CCD6-D314-4803-A6EB-FAB5614A40F7}" type="datetimeFigureOut">
               <a:rPr lang="es-GT" smtClean="0"/>
-              <a:t>19/03/2010</a:t>
+              <a:t>20/03/2010</a:t>
             </a:fld>
             <a:endParaRPr lang="es-GT"/>
           </a:p>
@@ -2507,7 +2509,7 @@
           <a:p>
             <a:fld id="{A766CCD6-D314-4803-A6EB-FAB5614A40F7}" type="datetimeFigureOut">
               <a:rPr lang="es-GT" smtClean="0"/>
-              <a:t>19/03/2010</a:t>
+              <a:t>20/03/2010</a:t>
             </a:fld>
             <a:endParaRPr lang="es-GT"/>
           </a:p>
@@ -2720,7 +2722,7 @@
           <a:p>
             <a:fld id="{A766CCD6-D314-4803-A6EB-FAB5614A40F7}" type="datetimeFigureOut">
               <a:rPr lang="es-GT" smtClean="0"/>
-              <a:t>19/03/2010</a:t>
+              <a:t>20/03/2010</a:t>
             </a:fld>
             <a:endParaRPr lang="es-GT"/>
           </a:p>
@@ -3117,24 +3119,54 @@
         </p:blipFill>
         <p:spPr>
           <a:xfrm>
-            <a:off x="1619672" y="1268760"/>
-            <a:ext cx="6172114" cy="1296144"/>
+            <a:off x="971600" y="2420888"/>
+            <a:ext cx="7543692" cy="1584176"/>
           </a:xfrm>
           <a:prstGeom prst="rect">
             <a:avLst/>
           </a:prstGeom>
         </p:spPr>
       </p:pic>
+    </p:spTree>
+    <p:extLst>
+      <p:ext uri="{BB962C8B-B14F-4D97-AF65-F5344CB8AC3E}">
+        <p14:creationId xmlns:p14="http://schemas.microsoft.com/office/powerpoint/2010/main" val="1155664975"/>
+      </p:ext>
+    </p:extLst>
+  </p:cSld>
+  <p:clrMapOvr>
+    <a:masterClrMapping/>
+  </p:clrMapOvr>
+</p:sld>
+</file>
+
+<file path=ppt/slides/slide2.xml><?xml version="1.0" encoding="utf-8"?>
+<p:sld xmlns:a="http://schemas.openxmlformats.org/drawingml/2006/main" xmlns:r="http://schemas.openxmlformats.org/officeDocument/2006/relationships" xmlns:p="http://schemas.openxmlformats.org/presentationml/2006/main">
+  <p:cSld>
+    <p:spTree>
+      <p:nvGrpSpPr>
+        <p:cNvPr id="1" name=""/>
+        <p:cNvGrpSpPr/>
+        <p:nvPr/>
+      </p:nvGrpSpPr>
+      <p:grpSpPr>
+        <a:xfrm>
+          <a:off x="0" y="0"/>
+          <a:ext cx="0" cy="0"/>
+          <a:chOff x="0" y="0"/>
+          <a:chExt cx="0" cy="0"/>
+        </a:xfrm>
+      </p:grpSpPr>
       <p:pic>
         <p:nvPicPr>
-          <p:cNvPr id="5" name="Picture 4"/>
+          <p:cNvPr id="2" name="Picture 1"/>
           <p:cNvPicPr>
             <a:picLocks noChangeAspect="1"/>
           </p:cNvPicPr>
           <p:nvPr/>
         </p:nvPicPr>
         <p:blipFill>
-          <a:blip r:embed="rId3">
+          <a:blip r:embed="rId2">
             <a:extLst>
               <a:ext uri="{28A0092B-C50C-407E-A947-70E740481C1C}">
                 <a14:useLocalDpi xmlns:a14="http://schemas.microsoft.com/office/drawing/2010/main" val="0"/>
@@ -3147,8 +3179,8 @@
         </p:blipFill>
         <p:spPr>
           <a:xfrm>
-            <a:off x="2411760" y="3501008"/>
-            <a:ext cx="4623498" cy="1178992"/>
+            <a:off x="3131840" y="2276872"/>
+            <a:ext cx="3166268" cy="1749319"/>
           </a:xfrm>
           <a:prstGeom prst="rect">
             <a:avLst/>
@@ -3158,7 +3190,67 @@
     </p:spTree>
     <p:extLst>
       <p:ext uri="{BB962C8B-B14F-4D97-AF65-F5344CB8AC3E}">
-        <p14:creationId xmlns:p14="http://schemas.microsoft.com/office/powerpoint/2010/main" val="1155664975"/>
+        <p14:creationId xmlns:p14="http://schemas.microsoft.com/office/powerpoint/2010/main" val="3507164473"/>
+      </p:ext>
+    </p:extLst>
+  </p:cSld>
+  <p:clrMapOvr>
+    <a:masterClrMapping/>
+  </p:clrMapOvr>
+</p:sld>
+</file>
+
+<file path=ppt/slides/slide3.xml><?xml version="1.0" encoding="utf-8"?>
+<p:sld xmlns:a="http://schemas.openxmlformats.org/drawingml/2006/main" xmlns:r="http://schemas.openxmlformats.org/officeDocument/2006/relationships" xmlns:p="http://schemas.openxmlformats.org/presentationml/2006/main">
+  <p:cSld>
+    <p:spTree>
+      <p:nvGrpSpPr>
+        <p:cNvPr id="1" name=""/>
+        <p:cNvGrpSpPr/>
+        <p:nvPr/>
+      </p:nvGrpSpPr>
+      <p:grpSpPr>
+        <a:xfrm>
+          <a:off x="0" y="0"/>
+          <a:ext cx="0" cy="0"/>
+          <a:chOff x="0" y="0"/>
+          <a:chExt cx="0" cy="0"/>
+        </a:xfrm>
+      </p:grpSpPr>
+      <p:pic>
+        <p:nvPicPr>
+          <p:cNvPr id="2" name="Picture 1"/>
+          <p:cNvPicPr>
+            <a:picLocks noChangeAspect="1"/>
+          </p:cNvPicPr>
+          <p:nvPr/>
+        </p:nvPicPr>
+        <p:blipFill>
+          <a:blip r:embed="rId2">
+            <a:extLst>
+              <a:ext uri="{28A0092B-C50C-407E-A947-70E740481C1C}">
+                <a14:useLocalDpi xmlns:a14="http://schemas.microsoft.com/office/drawing/2010/main" val="0"/>
+              </a:ext>
+            </a:extLst>
+          </a:blip>
+          <a:stretch>
+            <a:fillRect/>
+          </a:stretch>
+        </p:blipFill>
+        <p:spPr>
+          <a:xfrm>
+            <a:off x="2123728" y="2492896"/>
+            <a:ext cx="5470651" cy="1395016"/>
+          </a:xfrm>
+          <a:prstGeom prst="rect">
+            <a:avLst/>
+          </a:prstGeom>
+        </p:spPr>
+      </p:pic>
+    </p:spTree>
+    <p:extLst>
+      <p:ext uri="{BB962C8B-B14F-4D97-AF65-F5344CB8AC3E}">
+        <p14:creationId xmlns:p14="http://schemas.microsoft.com/office/powerpoint/2010/main" val="3286926229"/>
       </p:ext>
     </p:extLst>
   </p:cSld>

</xml_diff>